<commit_message>
add bootstrap. Make a boilerplate template and apply to new, edit,show and index pages
</commit_message>
<xml_diff>
--- a/Markd.pptx
+++ b/Markd.pptx
@@ -13,6 +13,8 @@
     <p:sldId id="260" r:id="rId7"/>
     <p:sldId id="261" r:id="rId8"/>
     <p:sldId id="263" r:id="rId9"/>
+    <p:sldId id="264" r:id="rId10"/>
+    <p:sldId id="265" r:id="rId11"/>
   </p:sldIdLst>
   <p:sldSz cx="12192000" cy="6858000"/>
   <p:notesSz cx="6858000" cy="9144000"/>
@@ -845,7 +847,7 @@
           <a:p>
             <a:fld id="{B8B7238D-A1BA-4C02-8B24-07AA404FF2CE}" type="datetimeFigureOut">
               <a:rPr lang="en-US" smtClean="0"/>
-              <a:t>8/4/2025</a:t>
+              <a:t>8/5/2025</a:t>
             </a:fld>
             <a:endParaRPr lang="en-US"/>
           </a:p>
@@ -1096,7 +1098,7 @@
           <a:p>
             <a:fld id="{B8B7238D-A1BA-4C02-8B24-07AA404FF2CE}" type="datetimeFigureOut">
               <a:rPr lang="en-US" smtClean="0"/>
-              <a:t>8/4/2025</a:t>
+              <a:t>8/5/2025</a:t>
             </a:fld>
             <a:endParaRPr lang="en-US"/>
           </a:p>
@@ -1410,7 +1412,7 @@
           <a:p>
             <a:fld id="{B8B7238D-A1BA-4C02-8B24-07AA404FF2CE}" type="datetimeFigureOut">
               <a:rPr lang="en-US" smtClean="0"/>
-              <a:t>8/4/2025</a:t>
+              <a:t>8/5/2025</a:t>
             </a:fld>
             <a:endParaRPr lang="en-US"/>
           </a:p>
@@ -1737,7 +1739,7 @@
           <a:p>
             <a:fld id="{B8B7238D-A1BA-4C02-8B24-07AA404FF2CE}" type="datetimeFigureOut">
               <a:rPr lang="en-US" smtClean="0"/>
-              <a:t>8/4/2025</a:t>
+              <a:t>8/5/2025</a:t>
             </a:fld>
             <a:endParaRPr lang="en-US"/>
           </a:p>
@@ -2051,7 +2053,7 @@
           <a:p>
             <a:fld id="{B8B7238D-A1BA-4C02-8B24-07AA404FF2CE}" type="datetimeFigureOut">
               <a:rPr lang="en-US" smtClean="0"/>
-              <a:t>8/4/2025</a:t>
+              <a:t>8/5/2025</a:t>
             </a:fld>
             <a:endParaRPr lang="en-US"/>
           </a:p>
@@ -2438,7 +2440,7 @@
           <a:p>
             <a:fld id="{B8B7238D-A1BA-4C02-8B24-07AA404FF2CE}" type="datetimeFigureOut">
               <a:rPr lang="en-US" smtClean="0"/>
-              <a:t>8/4/2025</a:t>
+              <a:t>8/5/2025</a:t>
             </a:fld>
             <a:endParaRPr lang="en-US"/>
           </a:p>
@@ -2608,7 +2610,7 @@
           <a:p>
             <a:fld id="{B8B7238D-A1BA-4C02-8B24-07AA404FF2CE}" type="datetimeFigureOut">
               <a:rPr lang="en-US" smtClean="0"/>
-              <a:t>8/4/2025</a:t>
+              <a:t>8/5/2025</a:t>
             </a:fld>
             <a:endParaRPr lang="en-US"/>
           </a:p>
@@ -2788,7 +2790,7 @@
           <a:p>
             <a:fld id="{B8B7238D-A1BA-4C02-8B24-07AA404FF2CE}" type="datetimeFigureOut">
               <a:rPr lang="en-US" smtClean="0"/>
-              <a:t>8/4/2025</a:t>
+              <a:t>8/5/2025</a:t>
             </a:fld>
             <a:endParaRPr lang="en-US"/>
           </a:p>
@@ -2958,7 +2960,7 @@
           <a:p>
             <a:fld id="{B8B7238D-A1BA-4C02-8B24-07AA404FF2CE}" type="datetimeFigureOut">
               <a:rPr lang="en-US" smtClean="0"/>
-              <a:t>8/4/2025</a:t>
+              <a:t>8/5/2025</a:t>
             </a:fld>
             <a:endParaRPr lang="en-US"/>
           </a:p>
@@ -3205,7 +3207,7 @@
           <a:p>
             <a:fld id="{B8B7238D-A1BA-4C02-8B24-07AA404FF2CE}" type="datetimeFigureOut">
               <a:rPr lang="en-US" smtClean="0"/>
-              <a:t>8/4/2025</a:t>
+              <a:t>8/5/2025</a:t>
             </a:fld>
             <a:endParaRPr lang="en-US"/>
           </a:p>
@@ -3437,7 +3439,7 @@
           <a:p>
             <a:fld id="{B8B7238D-A1BA-4C02-8B24-07AA404FF2CE}" type="datetimeFigureOut">
               <a:rPr lang="en-US" smtClean="0"/>
-              <a:t>8/4/2025</a:t>
+              <a:t>8/5/2025</a:t>
             </a:fld>
             <a:endParaRPr lang="en-US"/>
           </a:p>
@@ -3811,7 +3813,7 @@
           <a:p>
             <a:fld id="{B8B7238D-A1BA-4C02-8B24-07AA404FF2CE}" type="datetimeFigureOut">
               <a:rPr lang="en-US" smtClean="0"/>
-              <a:t>8/4/2025</a:t>
+              <a:t>8/5/2025</a:t>
             </a:fld>
             <a:endParaRPr lang="en-US"/>
           </a:p>
@@ -3934,7 +3936,7 @@
           <a:p>
             <a:fld id="{B8B7238D-A1BA-4C02-8B24-07AA404FF2CE}" type="datetimeFigureOut">
               <a:rPr lang="en-US" smtClean="0"/>
-              <a:t>8/4/2025</a:t>
+              <a:t>8/5/2025</a:t>
             </a:fld>
             <a:endParaRPr lang="en-US"/>
           </a:p>
@@ -4029,7 +4031,7 @@
           <a:p>
             <a:fld id="{B8B7238D-A1BA-4C02-8B24-07AA404FF2CE}" type="datetimeFigureOut">
               <a:rPr lang="en-US" smtClean="0"/>
-              <a:t>8/4/2025</a:t>
+              <a:t>8/5/2025</a:t>
             </a:fld>
             <a:endParaRPr lang="en-US"/>
           </a:p>
@@ -4284,7 +4286,7 @@
           <a:p>
             <a:fld id="{B8B7238D-A1BA-4C02-8B24-07AA404FF2CE}" type="datetimeFigureOut">
               <a:rPr lang="en-US" smtClean="0"/>
-              <a:t>8/4/2025</a:t>
+              <a:t>8/5/2025</a:t>
             </a:fld>
             <a:endParaRPr lang="en-US"/>
           </a:p>
@@ -4547,7 +4549,7 @@
           <a:p>
             <a:fld id="{B8B7238D-A1BA-4C02-8B24-07AA404FF2CE}" type="datetimeFigureOut">
               <a:rPr lang="en-US" smtClean="0"/>
-              <a:t>8/4/2025</a:t>
+              <a:t>8/5/2025</a:t>
             </a:fld>
             <a:endParaRPr lang="en-US"/>
           </a:p>
@@ -5292,7 +5294,7 @@
           <a:p>
             <a:fld id="{B8B7238D-A1BA-4C02-8B24-07AA404FF2CE}" type="datetimeFigureOut">
               <a:rPr lang="en-US" smtClean="0"/>
-              <a:t>8/4/2025</a:t>
+              <a:t>8/5/2025</a:t>
             </a:fld>
             <a:endParaRPr lang="en-US"/>
           </a:p>
@@ -5916,6 +5918,95 @@
 </p:sld>
 </file>
 
+<file path=ppt/slides/slide10.xml><?xml version="1.0" encoding="utf-8"?>
+<p:sld xmlns:a="http://schemas.openxmlformats.org/drawingml/2006/main" xmlns:r="http://schemas.openxmlformats.org/officeDocument/2006/relationships" xmlns:p="http://schemas.openxmlformats.org/presentationml/2006/main">
+  <p:cSld>
+    <p:spTree>
+      <p:nvGrpSpPr>
+        <p:cNvPr id="1" name=""/>
+        <p:cNvGrpSpPr/>
+        <p:nvPr/>
+      </p:nvGrpSpPr>
+      <p:grpSpPr>
+        <a:xfrm>
+          <a:off x="0" y="0"/>
+          <a:ext cx="0" cy="0"/>
+          <a:chOff x="0" y="0"/>
+          <a:chExt cx="0" cy="0"/>
+        </a:xfrm>
+      </p:grpSpPr>
+      <p:sp>
+        <p:nvSpPr>
+          <p:cNvPr id="2" name="Title 1">
+            <a:extLst>
+              <a:ext uri="{FF2B5EF4-FFF2-40B4-BE49-F238E27FC236}">
+                <a16:creationId xmlns:a16="http://schemas.microsoft.com/office/drawing/2014/main" id="{F2D5BB3B-9262-4546-BEDF-B0682E9037DC}"/>
+              </a:ext>
+            </a:extLst>
+          </p:cNvPr>
+          <p:cNvSpPr>
+            <a:spLocks noGrp="1"/>
+          </p:cNvSpPr>
+          <p:nvPr>
+            <p:ph type="title"/>
+          </p:nvPr>
+        </p:nvSpPr>
+        <p:spPr/>
+        <p:txBody>
+          <a:bodyPr/>
+          <a:lstStyle/>
+          <a:p>
+            <a:r>
+              <a:rPr lang="en-US" dirty="0"/>
+              <a:t>Color picker</a:t>
+            </a:r>
+          </a:p>
+        </p:txBody>
+      </p:sp>
+      <p:sp>
+        <p:nvSpPr>
+          <p:cNvPr id="3" name="Content Placeholder 2">
+            <a:extLst>
+              <a:ext uri="{FF2B5EF4-FFF2-40B4-BE49-F238E27FC236}">
+                <a16:creationId xmlns:a16="http://schemas.microsoft.com/office/drawing/2014/main" id="{7F8A35D9-0E5B-8731-D7F2-58EEDAF91A38}"/>
+              </a:ext>
+            </a:extLst>
+          </p:cNvPr>
+          <p:cNvSpPr>
+            <a:spLocks noGrp="1"/>
+          </p:cNvSpPr>
+          <p:nvPr>
+            <p:ph idx="1"/>
+          </p:nvPr>
+        </p:nvSpPr>
+        <p:spPr/>
+        <p:txBody>
+          <a:bodyPr/>
+          <a:lstStyle/>
+          <a:p>
+            <a:r>
+              <a:rPr lang="en-US" dirty="0">
+                <a:hlinkClick r:id="rId2"/>
+              </a:rPr>
+              <a:t>https://pickcoloronline.com/</a:t>
+            </a:r>
+            <a:endParaRPr lang="en-US" dirty="0"/>
+          </a:p>
+        </p:txBody>
+      </p:sp>
+    </p:spTree>
+    <p:extLst>
+      <p:ext uri="{BB962C8B-B14F-4D97-AF65-F5344CB8AC3E}">
+        <p14:creationId xmlns:p14="http://schemas.microsoft.com/office/powerpoint/2010/main" val="905597152"/>
+      </p:ext>
+    </p:extLst>
+  </p:cSld>
+  <p:clrMapOvr>
+    <a:masterClrMapping/>
+  </p:clrMapOvr>
+</p:sld>
+</file>
+
 <file path=ppt/slides/slide2.xml><?xml version="1.0" encoding="utf-8"?>
 <p:sld xmlns:a="http://schemas.openxmlformats.org/drawingml/2006/main" xmlns:r="http://schemas.openxmlformats.org/officeDocument/2006/relationships" xmlns:p="http://schemas.openxmlformats.org/presentationml/2006/main">
   <p:cSld>
@@ -6803,6 +6894,176 @@
     <p:extLst>
       <p:ext uri="{BB962C8B-B14F-4D97-AF65-F5344CB8AC3E}">
         <p14:creationId xmlns:p14="http://schemas.microsoft.com/office/powerpoint/2010/main" val="131844585"/>
+      </p:ext>
+    </p:extLst>
+  </p:cSld>
+  <p:clrMapOvr>
+    <a:masterClrMapping/>
+  </p:clrMapOvr>
+</p:sld>
+</file>
+
+<file path=ppt/slides/slide9.xml><?xml version="1.0" encoding="utf-8"?>
+<p:sld xmlns:a="http://schemas.openxmlformats.org/drawingml/2006/main" xmlns:r="http://schemas.openxmlformats.org/officeDocument/2006/relationships" xmlns:p="http://schemas.openxmlformats.org/presentationml/2006/main">
+  <p:cSld>
+    <p:spTree>
+      <p:nvGrpSpPr>
+        <p:cNvPr id="1" name=""/>
+        <p:cNvGrpSpPr/>
+        <p:nvPr/>
+      </p:nvGrpSpPr>
+      <p:grpSpPr>
+        <a:xfrm>
+          <a:off x="0" y="0"/>
+          <a:ext cx="0" cy="0"/>
+          <a:chOff x="0" y="0"/>
+          <a:chExt cx="0" cy="0"/>
+        </a:xfrm>
+      </p:grpSpPr>
+      <p:sp>
+        <p:nvSpPr>
+          <p:cNvPr id="2" name="Title 1">
+            <a:extLst>
+              <a:ext uri="{FF2B5EF4-FFF2-40B4-BE49-F238E27FC236}">
+                <a16:creationId xmlns:a16="http://schemas.microsoft.com/office/drawing/2014/main" id="{700968D0-9C29-ED9A-B01F-34212473DE2C}"/>
+              </a:ext>
+            </a:extLst>
+          </p:cNvPr>
+          <p:cNvSpPr>
+            <a:spLocks noGrp="1"/>
+          </p:cNvSpPr>
+          <p:nvPr>
+            <p:ph type="title"/>
+          </p:nvPr>
+        </p:nvSpPr>
+        <p:spPr/>
+        <p:txBody>
+          <a:bodyPr/>
+          <a:lstStyle/>
+          <a:p>
+            <a:r>
+              <a:rPr lang="en-US" dirty="0"/>
+              <a:t>Google fonts</a:t>
+            </a:r>
+          </a:p>
+        </p:txBody>
+      </p:sp>
+      <p:sp>
+        <p:nvSpPr>
+          <p:cNvPr id="3" name="Content Placeholder 2">
+            <a:extLst>
+              <a:ext uri="{FF2B5EF4-FFF2-40B4-BE49-F238E27FC236}">
+                <a16:creationId xmlns:a16="http://schemas.microsoft.com/office/drawing/2014/main" id="{FBEE2FFD-8D77-C525-7CD4-E6991D48E484}"/>
+              </a:ext>
+            </a:extLst>
+          </p:cNvPr>
+          <p:cNvSpPr>
+            <a:spLocks noGrp="1"/>
+          </p:cNvSpPr>
+          <p:nvPr>
+            <p:ph idx="1"/>
+          </p:nvPr>
+        </p:nvSpPr>
+        <p:spPr/>
+        <p:txBody>
+          <a:bodyPr/>
+          <a:lstStyle/>
+          <a:p>
+            <a:r>
+              <a:rPr lang="en-US" dirty="0"/>
+              <a:t>&lt;link </a:t>
+            </a:r>
+            <a:r>
+              <a:rPr lang="en-US" dirty="0" err="1"/>
+              <a:t>rel</a:t>
+            </a:r>
+            <a:r>
+              <a:rPr lang="en-US" dirty="0"/>
+              <a:t>="</a:t>
+            </a:r>
+            <a:r>
+              <a:rPr lang="en-US" dirty="0" err="1"/>
+              <a:t>preconnect</a:t>
+            </a:r>
+            <a:r>
+              <a:rPr lang="en-US" dirty="0"/>
+              <a:t>" </a:t>
+            </a:r>
+            <a:r>
+              <a:rPr lang="en-US" dirty="0" err="1"/>
+              <a:t>href</a:t>
+            </a:r>
+            <a:r>
+              <a:rPr lang="en-US" dirty="0"/>
+              <a:t>="https://fonts.googleapis.com"&gt;</a:t>
+            </a:r>
+          </a:p>
+          <a:p>
+            <a:r>
+              <a:rPr lang="en-US" dirty="0"/>
+              <a:t>&lt;link </a:t>
+            </a:r>
+            <a:r>
+              <a:rPr lang="en-US" dirty="0" err="1"/>
+              <a:t>rel</a:t>
+            </a:r>
+            <a:r>
+              <a:rPr lang="en-US" dirty="0"/>
+              <a:t>="</a:t>
+            </a:r>
+            <a:r>
+              <a:rPr lang="en-US" dirty="0" err="1"/>
+              <a:t>preconnect</a:t>
+            </a:r>
+            <a:r>
+              <a:rPr lang="en-US" dirty="0"/>
+              <a:t>" </a:t>
+            </a:r>
+            <a:r>
+              <a:rPr lang="en-US" dirty="0" err="1"/>
+              <a:t>href</a:t>
+            </a:r>
+            <a:r>
+              <a:rPr lang="en-US" dirty="0"/>
+              <a:t>="https://fonts.gstatic.com" </a:t>
+            </a:r>
+            <a:r>
+              <a:rPr lang="en-US" dirty="0" err="1"/>
+              <a:t>crossorigin</a:t>
+            </a:r>
+            <a:r>
+              <a:rPr lang="en-US" dirty="0"/>
+              <a:t>&gt;</a:t>
+            </a:r>
+          </a:p>
+          <a:p>
+            <a:r>
+              <a:rPr lang="en-US" dirty="0"/>
+              <a:t>&lt;link </a:t>
+            </a:r>
+            <a:r>
+              <a:rPr lang="en-US" dirty="0" err="1"/>
+              <a:t>href</a:t>
+            </a:r>
+            <a:r>
+              <a:rPr lang="en-US" dirty="0"/>
+              <a:t>="https://fonts.googleapis.com/css2?family=Open+Sans:ital,wght@0,300..800;1,300..800&amp;family=Playwrite+HU:wght@100..400&amp;family=Radio+Canada:ital,wght@0,300..700;1,300..700&amp;display=swap" </a:t>
+            </a:r>
+            <a:r>
+              <a:rPr lang="en-US" dirty="0" err="1"/>
+              <a:t>rel</a:t>
+            </a:r>
+            <a:r>
+              <a:rPr lang="en-US" dirty="0"/>
+              <a:t>="stylesheet"&gt;</a:t>
+            </a:r>
+          </a:p>
+        </p:txBody>
+      </p:sp>
+    </p:spTree>
+    <p:extLst>
+      <p:ext uri="{BB962C8B-B14F-4D97-AF65-F5344CB8AC3E}">
+        <p14:creationId xmlns:p14="http://schemas.microsoft.com/office/powerpoint/2010/main" val="730263913"/>
       </p:ext>
     </p:extLst>
   </p:cSld>

</xml_diff>